<commit_message>
added features in presentation
</commit_message>
<xml_diff>
--- a/продажи/DinerBot пример заказа.pptx
+++ b/продажи/DinerBot пример заказа.pptx
@@ -5,24 +5,25 @@
     <p:sldMasterId id="2147483657" r:id="rId1"/>
   </p:sldMasterIdLst>
   <p:notesMasterIdLst>
-    <p:notesMasterId r:id="rId7"/>
+    <p:notesMasterId r:id="rId8"/>
   </p:notesMasterIdLst>
   <p:sldIdLst>
     <p:sldId id="256" r:id="rId2"/>
     <p:sldId id="284" r:id="rId3"/>
     <p:sldId id="261" r:id="rId4"/>
-    <p:sldId id="285" r:id="rId5"/>
-    <p:sldId id="279" r:id="rId6"/>
+    <p:sldId id="286" r:id="rId5"/>
+    <p:sldId id="285" r:id="rId6"/>
+    <p:sldId id="279" r:id="rId7"/>
   </p:sldIdLst>
   <p:sldSz cx="9144000" cy="6858000" type="screen4x3"/>
   <p:notesSz cx="6858000" cy="9144000"/>
   <p:embeddedFontLst>
     <p:embeddedFont>
       <p:font typeface="Montserrat" panose="020B0604020202020204" charset="-52"/>
-      <p:regular r:id="rId8"/>
-      <p:bold r:id="rId9"/>
-      <p:italic r:id="rId10"/>
-      <p:boldItalic r:id="rId11"/>
+      <p:regular r:id="rId9"/>
+      <p:bold r:id="rId10"/>
+      <p:italic r:id="rId11"/>
+      <p:boldItalic r:id="rId12"/>
     </p:embeddedFont>
   </p:embeddedFontLst>
   <p:defaultTextStyle>
@@ -823,6 +824,112 @@
   <p:cSld>
     <p:spTree>
       <p:nvGrpSpPr>
+        <p:cNvPr id="1" name="Shape 54"/>
+        <p:cNvGrpSpPr/>
+        <p:nvPr/>
+      </p:nvGrpSpPr>
+      <p:grpSpPr>
+        <a:xfrm>
+          <a:off x="0" y="0"/>
+          <a:ext cx="0" cy="0"/>
+          <a:chOff x="0" y="0"/>
+          <a:chExt cx="0" cy="0"/>
+        </a:xfrm>
+      </p:grpSpPr>
+      <p:sp>
+        <p:nvSpPr>
+          <p:cNvPr id="55" name="Shape 55"/>
+          <p:cNvSpPr>
+            <a:spLocks noGrp="1" noRot="1" noChangeAspect="1"/>
+          </p:cNvSpPr>
+          <p:nvPr>
+            <p:ph type="sldImg" idx="2"/>
+          </p:nvPr>
+        </p:nvSpPr>
+        <p:spPr>
+          <a:xfrm>
+            <a:off x="1143000" y="685800"/>
+            <a:ext cx="4572000" cy="3429000"/>
+          </a:xfrm>
+          <a:custGeom>
+            <a:avLst/>
+            <a:gdLst/>
+            <a:ahLst/>
+            <a:cxnLst/>
+            <a:rect l="0" t="0" r="0" b="0"/>
+            <a:pathLst>
+              <a:path w="120000" h="120000" extrusionOk="0">
+                <a:moveTo>
+                  <a:pt x="0" y="0"/>
+                </a:moveTo>
+                <a:lnTo>
+                  <a:pt x="120000" y="0"/>
+                </a:lnTo>
+                <a:lnTo>
+                  <a:pt x="120000" y="120000"/>
+                </a:lnTo>
+                <a:lnTo>
+                  <a:pt x="0" y="120000"/>
+                </a:lnTo>
+                <a:close/>
+              </a:path>
+            </a:pathLst>
+          </a:custGeom>
+        </p:spPr>
+      </p:sp>
+      <p:sp>
+        <p:nvSpPr>
+          <p:cNvPr id="56" name="Shape 56"/>
+          <p:cNvSpPr txBox="1">
+            <a:spLocks noGrp="1"/>
+          </p:cNvSpPr>
+          <p:nvPr>
+            <p:ph type="body" idx="1"/>
+          </p:nvPr>
+        </p:nvSpPr>
+        <p:spPr>
+          <a:xfrm>
+            <a:off x="685800" y="4343400"/>
+            <a:ext cx="5486400" cy="4114800"/>
+          </a:xfrm>
+          <a:prstGeom prst="rect">
+            <a:avLst/>
+          </a:prstGeom>
+        </p:spPr>
+        <p:txBody>
+          <a:bodyPr wrap="square" lIns="91425" tIns="91425" rIns="91425" bIns="91425" anchor="t" anchorCtr="0">
+            <a:noAutofit/>
+          </a:bodyPr>
+          <a:lstStyle/>
+          <a:p>
+            <a:pPr marL="0" lvl="0" indent="0">
+              <a:spcBef>
+                <a:spcPts val="0"/>
+              </a:spcBef>
+              <a:buNone/>
+            </a:pPr>
+            <a:endParaRPr/>
+          </a:p>
+        </p:txBody>
+      </p:sp>
+    </p:spTree>
+    <p:extLst>
+      <p:ext uri="{BB962C8B-B14F-4D97-AF65-F5344CB8AC3E}">
+        <p14:creationId xmlns:p14="http://schemas.microsoft.com/office/powerpoint/2010/main" val="2625589564"/>
+      </p:ext>
+    </p:extLst>
+  </p:cSld>
+  <p:clrMapOvr>
+    <a:masterClrMapping/>
+  </p:clrMapOvr>
+</p:notes>
+</file>
+
+<file path=ppt/notesSlides/notesSlide5.xml><?xml version="1.0" encoding="utf-8"?>
+<p:notes xmlns:a="http://schemas.openxmlformats.org/drawingml/2006/main" xmlns:r="http://schemas.openxmlformats.org/officeDocument/2006/relationships" xmlns:p="http://schemas.openxmlformats.org/presentationml/2006/main" showMasterSp="0" showMasterPhAnim="0">
+  <p:cSld>
+    <p:spTree>
+      <p:nvGrpSpPr>
         <p:cNvPr id="1" name="Shape 82"/>
         <p:cNvGrpSpPr/>
         <p:nvPr/>
@@ -924,7 +1031,7 @@
 </p:notes>
 </file>
 
-<file path=ppt/notesSlides/notesSlide5.xml><?xml version="1.0" encoding="utf-8"?>
+<file path=ppt/notesSlides/notesSlide6.xml><?xml version="1.0" encoding="utf-8"?>
 <p:notes xmlns:a="http://schemas.openxmlformats.org/drawingml/2006/main" xmlns:r="http://schemas.openxmlformats.org/officeDocument/2006/relationships" xmlns:p="http://schemas.openxmlformats.org/presentationml/2006/main" showMasterSp="0" showMasterPhAnim="0">
   <p:cSld>
     <p:spTree>
@@ -3191,11 +3298,7 @@
             </a:r>
             <a:r>
               <a:rPr lang="ru-RU" dirty="0" smtClean="0"/>
-              <a:t>роцесс </a:t>
-            </a:r>
-            <a:r>
-              <a:rPr lang="ru-RU" dirty="0" smtClean="0"/>
-              <a:t>заказа в боте</a:t>
+              <a:t>роцесс заказа в боте</a:t>
             </a:r>
             <a:endParaRPr lang="en" dirty="0"/>
           </a:p>
@@ -3554,19 +3657,7 @@
                 <a:cs typeface="Montserrat"/>
                 <a:sym typeface="Montserrat"/>
               </a:rPr>
-              <a:t>Добавляем </a:t>
-            </a:r>
-            <a:r>
-              <a:rPr lang="ru-RU" sz="1200" dirty="0" smtClean="0">
-                <a:solidFill>
-                  <a:srgbClr val="454F5B"/>
-                </a:solidFill>
-                <a:latin typeface="Montserrat"/>
-                <a:ea typeface="Montserrat"/>
-                <a:cs typeface="Montserrat"/>
-                <a:sym typeface="Montserrat"/>
-              </a:rPr>
-              <a:t>бота</a:t>
+              <a:t>Добавляем бота</a:t>
             </a:r>
             <a:endParaRPr lang="en" sz="1200" dirty="0">
               <a:solidFill>
@@ -3989,19 +4080,7 @@
                 <a:cs typeface="Montserrat"/>
                 <a:sym typeface="Montserrat"/>
               </a:rPr>
-              <a:t>ApplePay</a:t>
-            </a:r>
-            <a:r>
-              <a:rPr lang="en-US" sz="1200" dirty="0" smtClean="0">
-                <a:solidFill>
-                  <a:srgbClr val="454F5B"/>
-                </a:solidFill>
-                <a:latin typeface="Montserrat"/>
-                <a:ea typeface="Montserrat"/>
-                <a:cs typeface="Montserrat"/>
-                <a:sym typeface="Montserrat"/>
-              </a:rPr>
-              <a:t>, </a:t>
+              <a:t>ApplePay, </a:t>
             </a:r>
             <a:r>
               <a:rPr lang="ru-RU" sz="1200" dirty="0" smtClean="0">
@@ -4013,19 +4092,7 @@
                 <a:cs typeface="Montserrat"/>
                 <a:sym typeface="Montserrat"/>
               </a:rPr>
-              <a:t>карта</a:t>
-            </a:r>
-            <a:r>
-              <a:rPr lang="ru-RU" sz="1200" dirty="0" smtClean="0">
-                <a:solidFill>
-                  <a:srgbClr val="454F5B"/>
-                </a:solidFill>
-                <a:latin typeface="Montserrat"/>
-                <a:ea typeface="Montserrat"/>
-                <a:cs typeface="Montserrat"/>
-                <a:sym typeface="Montserrat"/>
-              </a:rPr>
-              <a:t>)</a:t>
+              <a:t>карта)</a:t>
             </a:r>
             <a:endParaRPr lang="en" sz="1200" dirty="0">
               <a:solidFill>
@@ -4139,6 +4206,313 @@
   <p:cSld>
     <p:spTree>
       <p:nvGrpSpPr>
+        <p:cNvPr id="1" name="Shape 57"/>
+        <p:cNvGrpSpPr/>
+        <p:nvPr/>
+      </p:nvGrpSpPr>
+      <p:grpSpPr>
+        <a:xfrm>
+          <a:off x="0" y="0"/>
+          <a:ext cx="0" cy="0"/>
+          <a:chOff x="0" y="0"/>
+          <a:chExt cx="0" cy="0"/>
+        </a:xfrm>
+      </p:grpSpPr>
+      <p:sp>
+        <p:nvSpPr>
+          <p:cNvPr id="58" name="Shape 58"/>
+          <p:cNvSpPr txBox="1">
+            <a:spLocks noGrp="1"/>
+          </p:cNvSpPr>
+          <p:nvPr>
+            <p:ph type="title"/>
+          </p:nvPr>
+        </p:nvSpPr>
+        <p:spPr>
+          <a:xfrm>
+            <a:off x="691200" y="724626"/>
+            <a:ext cx="7761600" cy="553646"/>
+          </a:xfrm>
+          <a:prstGeom prst="rect">
+            <a:avLst/>
+          </a:prstGeom>
+        </p:spPr>
+        <p:txBody>
+          <a:bodyPr wrap="square" lIns="91425" tIns="91425" rIns="91425" bIns="91425" anchor="b" anchorCtr="0">
+            <a:noAutofit/>
+          </a:bodyPr>
+          <a:lstStyle/>
+          <a:p>
+            <a:r>
+              <a:rPr lang="ru-RU" dirty="0" smtClean="0"/>
+              <a:t>А так же…</a:t>
+            </a:r>
+            <a:endParaRPr lang="ru-RU" dirty="0"/>
+          </a:p>
+        </p:txBody>
+      </p:sp>
+      <p:sp>
+        <p:nvSpPr>
+          <p:cNvPr id="8" name="Shape 60"/>
+          <p:cNvSpPr txBox="1"/>
+          <p:nvPr/>
+        </p:nvSpPr>
+        <p:spPr>
+          <a:xfrm>
+            <a:off x="527538" y="5838091"/>
+            <a:ext cx="2409093" cy="699995"/>
+          </a:xfrm>
+          <a:prstGeom prst="rect">
+            <a:avLst/>
+          </a:prstGeom>
+          <a:noFill/>
+          <a:ln>
+            <a:noFill/>
+          </a:ln>
+        </p:spPr>
+        <p:txBody>
+          <a:bodyPr wrap="square" lIns="91425" tIns="91425" rIns="91425" bIns="91425" anchor="t" anchorCtr="0">
+            <a:noAutofit/>
+          </a:bodyPr>
+          <a:lstStyle/>
+          <a:p>
+            <a:r>
+              <a:rPr lang="ru-RU" sz="1200" dirty="0" smtClean="0">
+                <a:solidFill>
+                  <a:srgbClr val="454F5B"/>
+                </a:solidFill>
+                <a:latin typeface="Montserrat"/>
+                <a:ea typeface="Montserrat"/>
+                <a:cs typeface="Montserrat"/>
+                <a:sym typeface="Montserrat"/>
+              </a:rPr>
+              <a:t>Отложенный заказ. Вы будете точно знать когда придет клиент.</a:t>
+            </a:r>
+            <a:endParaRPr lang="en" sz="1200" dirty="0">
+              <a:solidFill>
+                <a:srgbClr val="454F5B"/>
+              </a:solidFill>
+              <a:latin typeface="Montserrat"/>
+              <a:ea typeface="Montserrat"/>
+              <a:cs typeface="Montserrat"/>
+              <a:sym typeface="Montserrat"/>
+            </a:endParaRPr>
+          </a:p>
+        </p:txBody>
+      </p:sp>
+      <p:pic>
+        <p:nvPicPr>
+          <p:cNvPr id="3" name="Рисунок 2"/>
+          <p:cNvPicPr>
+            <a:picLocks noChangeAspect="1"/>
+          </p:cNvPicPr>
+          <p:nvPr/>
+        </p:nvPicPr>
+        <p:blipFill>
+          <a:blip r:embed="rId3">
+            <a:extLst>
+              <a:ext uri="{28A0092B-C50C-407E-A947-70E740481C1C}">
+                <a14:useLocalDpi xmlns:a14="http://schemas.microsoft.com/office/drawing/2010/main" val="0"/>
+              </a:ext>
+            </a:extLst>
+          </a:blip>
+          <a:stretch>
+            <a:fillRect/>
+          </a:stretch>
+        </p:blipFill>
+        <p:spPr>
+          <a:xfrm>
+            <a:off x="3486930" y="1978267"/>
+            <a:ext cx="2170066" cy="3859824"/>
+          </a:xfrm>
+          <a:prstGeom prst="rect">
+            <a:avLst/>
+          </a:prstGeom>
+        </p:spPr>
+      </p:pic>
+      <p:pic>
+        <p:nvPicPr>
+          <p:cNvPr id="4" name="Рисунок 3"/>
+          <p:cNvPicPr>
+            <a:picLocks noChangeAspect="1"/>
+          </p:cNvPicPr>
+          <p:nvPr/>
+        </p:nvPicPr>
+        <p:blipFill>
+          <a:blip r:embed="rId4">
+            <a:extLst>
+              <a:ext uri="{28A0092B-C50C-407E-A947-70E740481C1C}">
+                <a14:useLocalDpi xmlns:a14="http://schemas.microsoft.com/office/drawing/2010/main" val="0"/>
+              </a:ext>
+            </a:extLst>
+          </a:blip>
+          <a:stretch>
+            <a:fillRect/>
+          </a:stretch>
+        </p:blipFill>
+        <p:spPr>
+          <a:xfrm>
+            <a:off x="691200" y="1978268"/>
+            <a:ext cx="2170065" cy="3859823"/>
+          </a:xfrm>
+          <a:prstGeom prst="rect">
+            <a:avLst/>
+          </a:prstGeom>
+        </p:spPr>
+      </p:pic>
+      <p:pic>
+        <p:nvPicPr>
+          <p:cNvPr id="9" name="Рисунок 8"/>
+          <p:cNvPicPr>
+            <a:picLocks noChangeAspect="1"/>
+          </p:cNvPicPr>
+          <p:nvPr/>
+        </p:nvPicPr>
+        <p:blipFill>
+          <a:blip r:embed="rId5">
+            <a:extLst>
+              <a:ext uri="{28A0092B-C50C-407E-A947-70E740481C1C}">
+                <a14:useLocalDpi xmlns:a14="http://schemas.microsoft.com/office/drawing/2010/main" val="0"/>
+              </a:ext>
+            </a:extLst>
+          </a:blip>
+          <a:stretch>
+            <a:fillRect/>
+          </a:stretch>
+        </p:blipFill>
+        <p:spPr>
+          <a:xfrm>
+            <a:off x="6282661" y="1978267"/>
+            <a:ext cx="2170139" cy="3859953"/>
+          </a:xfrm>
+          <a:prstGeom prst="rect">
+            <a:avLst/>
+          </a:prstGeom>
+        </p:spPr>
+      </p:pic>
+      <p:sp>
+        <p:nvSpPr>
+          <p:cNvPr id="11" name="Shape 60"/>
+          <p:cNvSpPr txBox="1"/>
+          <p:nvPr/>
+        </p:nvSpPr>
+        <p:spPr>
+          <a:xfrm>
+            <a:off x="3478101" y="5838090"/>
+            <a:ext cx="2409093" cy="699995"/>
+          </a:xfrm>
+          <a:prstGeom prst="rect">
+            <a:avLst/>
+          </a:prstGeom>
+          <a:noFill/>
+          <a:ln>
+            <a:noFill/>
+          </a:ln>
+        </p:spPr>
+        <p:txBody>
+          <a:bodyPr wrap="square" lIns="91425" tIns="91425" rIns="91425" bIns="91425" anchor="t" anchorCtr="0">
+            <a:noAutofit/>
+          </a:bodyPr>
+          <a:lstStyle/>
+          <a:p>
+            <a:r>
+              <a:rPr lang="ru-RU" sz="1200" dirty="0" smtClean="0">
+                <a:solidFill>
+                  <a:srgbClr val="454F5B"/>
+                </a:solidFill>
+                <a:latin typeface="Montserrat"/>
+                <a:ea typeface="Montserrat"/>
+                <a:cs typeface="Montserrat"/>
+                <a:sym typeface="Montserrat"/>
+              </a:rPr>
+              <a:t>Разные способы оплаты, включая оплату наличными в заведении.</a:t>
+            </a:r>
+            <a:endParaRPr lang="en" sz="1200" dirty="0">
+              <a:solidFill>
+                <a:srgbClr val="454F5B"/>
+              </a:solidFill>
+              <a:latin typeface="Montserrat"/>
+              <a:ea typeface="Montserrat"/>
+              <a:cs typeface="Montserrat"/>
+              <a:sym typeface="Montserrat"/>
+            </a:endParaRPr>
+          </a:p>
+        </p:txBody>
+      </p:sp>
+      <p:sp>
+        <p:nvSpPr>
+          <p:cNvPr id="12" name="Shape 60"/>
+          <p:cNvSpPr txBox="1"/>
+          <p:nvPr/>
+        </p:nvSpPr>
+        <p:spPr>
+          <a:xfrm>
+            <a:off x="6282661" y="5838089"/>
+            <a:ext cx="2409093" cy="699995"/>
+          </a:xfrm>
+          <a:prstGeom prst="rect">
+            <a:avLst/>
+          </a:prstGeom>
+          <a:noFill/>
+          <a:ln>
+            <a:noFill/>
+          </a:ln>
+        </p:spPr>
+        <p:txBody>
+          <a:bodyPr wrap="square" lIns="91425" tIns="91425" rIns="91425" bIns="91425" anchor="t" anchorCtr="0">
+            <a:noAutofit/>
+          </a:bodyPr>
+          <a:lstStyle/>
+          <a:p>
+            <a:r>
+              <a:rPr lang="ru-RU" sz="1200" dirty="0" smtClean="0">
+                <a:solidFill>
+                  <a:srgbClr val="454F5B"/>
+                </a:solidFill>
+                <a:latin typeface="Montserrat"/>
+                <a:ea typeface="Montserrat"/>
+                <a:cs typeface="Montserrat"/>
+                <a:sym typeface="Montserrat"/>
+              </a:rPr>
+              <a:t>Интеграция с Яндекс Кассой, Сбербанком и другими провайдерами.</a:t>
+            </a:r>
+            <a:endParaRPr lang="en" sz="1200" dirty="0">
+              <a:solidFill>
+                <a:srgbClr val="454F5B"/>
+              </a:solidFill>
+              <a:latin typeface="Montserrat"/>
+              <a:ea typeface="Montserrat"/>
+              <a:cs typeface="Montserrat"/>
+              <a:sym typeface="Montserrat"/>
+            </a:endParaRPr>
+          </a:p>
+        </p:txBody>
+      </p:sp>
+    </p:spTree>
+    <p:extLst>
+      <p:ext uri="{BB962C8B-B14F-4D97-AF65-F5344CB8AC3E}">
+        <p14:creationId xmlns:p14="http://schemas.microsoft.com/office/powerpoint/2010/main" val="2155018663"/>
+      </p:ext>
+    </p:extLst>
+  </p:cSld>
+  <p:clrMapOvr>
+    <a:masterClrMapping/>
+  </p:clrMapOvr>
+  <p:timing>
+    <p:tnLst>
+      <p:par>
+        <p:cTn id="1" dur="indefinite" restart="never" nodeType="tmRoot"/>
+      </p:par>
+    </p:tnLst>
+  </p:timing>
+</p:sld>
+</file>
+
+<file path=ppt/slides/slide5.xml><?xml version="1.0" encoding="utf-8"?>
+<p:sld xmlns:a="http://schemas.openxmlformats.org/drawingml/2006/main" xmlns:r="http://schemas.openxmlformats.org/officeDocument/2006/relationships" xmlns:p="http://schemas.openxmlformats.org/presentationml/2006/main">
+  <p:cSld>
+    <p:spTree>
+      <p:nvGrpSpPr>
         <p:cNvPr id="1" name="Shape 85"/>
         <p:cNvGrpSpPr/>
         <p:nvPr/>
@@ -4596,7 +4970,7 @@
 </p:sld>
 </file>
 
-<file path=ppt/slides/slide5.xml><?xml version="1.0" encoding="utf-8"?>
+<file path=ppt/slides/slide6.xml><?xml version="1.0" encoding="utf-8"?>
 <p:sld xmlns:a="http://schemas.openxmlformats.org/drawingml/2006/main" xmlns:r="http://schemas.openxmlformats.org/officeDocument/2006/relationships" xmlns:p="http://schemas.openxmlformats.org/presentationml/2006/main">
   <p:cSld>
     <p:spTree>

</xml_diff>